<commit_message>
Archive waf and poker-challange
</commit_message>
<xml_diff>
--- a/information_systems/real_time_uml/prezi.pptx
+++ b/information_systems/real_time_uml/prezi.pptx
@@ -111,6 +111,11 @@
       </a:defRPr>
     </a:lvl9pPr>
   </p:defaultTextStyle>
+  <p:extLst>
+    <p:ext uri="{EFAFB233-063F-42B5-8137-9DF3F51BA10A}">
+      <p15:sldGuideLst xmlns:p15="http://schemas.microsoft.com/office/powerpoint/2012/main"/>
+    </p:ext>
+  </p:extLst>
 </p:presentation>
 </file>
 
@@ -159,7 +164,6 @@
               <a:rPr lang="hu-HU"/>
               <a:t>Mintacím szerkesztése</a:t>
             </a:r>
-            <a:endParaRPr lang="hu-HU"/>
           </a:p>
         </p:txBody>
       </p:sp>
@@ -224,7 +228,6 @@
               <a:rPr lang="hu-HU"/>
               <a:t>Kattintson ide az alcím mintájának szerkesztéséhez</a:t>
             </a:r>
-            <a:endParaRPr lang="hu-HU"/>
           </a:p>
         </p:txBody>
       </p:sp>
@@ -245,7 +248,7 @@
           <a:p>
             <a:fld id="{14184A55-F98C-4DCF-B43B-D8B9973F5BA3}" type="datetimeFigureOut">
               <a:rPr lang="hu-HU" smtClean="0"/>
-              <a:t>2016. 11. 20.</a:t>
+              <a:t>2016.11.23.</a:t>
             </a:fld>
             <a:endParaRPr lang="hu-HU"/>
           </a:p>
@@ -342,7 +345,6 @@
               <a:rPr lang="hu-HU"/>
               <a:t>Mintacím szerkesztése</a:t>
             </a:r>
-            <a:endParaRPr lang="hu-HU"/>
           </a:p>
         </p:txBody>
       </p:sp>
@@ -394,7 +396,6 @@
               <a:rPr lang="hu-HU"/>
               <a:t>Ötödik szint</a:t>
             </a:r>
-            <a:endParaRPr lang="hu-HU"/>
           </a:p>
         </p:txBody>
       </p:sp>
@@ -415,7 +416,7 @@
           <a:p>
             <a:fld id="{14184A55-F98C-4DCF-B43B-D8B9973F5BA3}" type="datetimeFigureOut">
               <a:rPr lang="hu-HU" smtClean="0"/>
-              <a:t>2016. 11. 20.</a:t>
+              <a:t>2016.11.23.</a:t>
             </a:fld>
             <a:endParaRPr lang="hu-HU"/>
           </a:p>
@@ -517,7 +518,6 @@
               <a:rPr lang="hu-HU"/>
               <a:t>Mintacím szerkesztése</a:t>
             </a:r>
-            <a:endParaRPr lang="hu-HU"/>
           </a:p>
         </p:txBody>
       </p:sp>
@@ -574,7 +574,6 @@
               <a:rPr lang="hu-HU"/>
               <a:t>Ötödik szint</a:t>
             </a:r>
-            <a:endParaRPr lang="hu-HU"/>
           </a:p>
         </p:txBody>
       </p:sp>
@@ -595,7 +594,7 @@
           <a:p>
             <a:fld id="{14184A55-F98C-4DCF-B43B-D8B9973F5BA3}" type="datetimeFigureOut">
               <a:rPr lang="hu-HU" smtClean="0"/>
-              <a:t>2016. 11. 20.</a:t>
+              <a:t>2016.11.23.</a:t>
             </a:fld>
             <a:endParaRPr lang="hu-HU"/>
           </a:p>
@@ -692,7 +691,6 @@
               <a:rPr lang="hu-HU"/>
               <a:t>Mintacím szerkesztése</a:t>
             </a:r>
-            <a:endParaRPr lang="hu-HU"/>
           </a:p>
         </p:txBody>
       </p:sp>
@@ -744,7 +742,6 @@
               <a:rPr lang="hu-HU"/>
               <a:t>Ötödik szint</a:t>
             </a:r>
-            <a:endParaRPr lang="hu-HU"/>
           </a:p>
         </p:txBody>
       </p:sp>
@@ -765,7 +762,7 @@
           <a:p>
             <a:fld id="{14184A55-F98C-4DCF-B43B-D8B9973F5BA3}" type="datetimeFigureOut">
               <a:rPr lang="hu-HU" smtClean="0"/>
-              <a:t>2016. 11. 20.</a:t>
+              <a:t>2016.11.23.</a:t>
             </a:fld>
             <a:endParaRPr lang="hu-HU"/>
           </a:p>
@@ -871,7 +868,6 @@
               <a:rPr lang="hu-HU"/>
               <a:t>Mintacím szerkesztése</a:t>
             </a:r>
-            <a:endParaRPr lang="hu-HU"/>
           </a:p>
         </p:txBody>
       </p:sp>
@@ -1011,7 +1007,7 @@
           <a:p>
             <a:fld id="{14184A55-F98C-4DCF-B43B-D8B9973F5BA3}" type="datetimeFigureOut">
               <a:rPr lang="hu-HU" smtClean="0"/>
-              <a:t>2016. 11. 20.</a:t>
+              <a:t>2016.11.23.</a:t>
             </a:fld>
             <a:endParaRPr lang="hu-HU"/>
           </a:p>
@@ -1108,7 +1104,6 @@
               <a:rPr lang="hu-HU"/>
               <a:t>Mintacím szerkesztése</a:t>
             </a:r>
-            <a:endParaRPr lang="hu-HU"/>
           </a:p>
         </p:txBody>
       </p:sp>
@@ -1165,7 +1160,6 @@
               <a:rPr lang="hu-HU"/>
               <a:t>Ötödik szint</a:t>
             </a:r>
-            <a:endParaRPr lang="hu-HU"/>
           </a:p>
         </p:txBody>
       </p:sp>
@@ -1222,7 +1216,6 @@
               <a:rPr lang="hu-HU"/>
               <a:t>Ötödik szint</a:t>
             </a:r>
-            <a:endParaRPr lang="hu-HU"/>
           </a:p>
         </p:txBody>
       </p:sp>
@@ -1243,7 +1236,7 @@
           <a:p>
             <a:fld id="{14184A55-F98C-4DCF-B43B-D8B9973F5BA3}" type="datetimeFigureOut">
               <a:rPr lang="hu-HU" smtClean="0"/>
-              <a:t>2016. 11. 20.</a:t>
+              <a:t>2016.11.23.</a:t>
             </a:fld>
             <a:endParaRPr lang="hu-HU"/>
           </a:p>
@@ -1345,7 +1338,6 @@
               <a:rPr lang="hu-HU"/>
               <a:t>Mintacím szerkesztése</a:t>
             </a:r>
-            <a:endParaRPr lang="hu-HU"/>
           </a:p>
         </p:txBody>
       </p:sp>
@@ -1467,7 +1459,6 @@
               <a:rPr lang="hu-HU"/>
               <a:t>Ötödik szint</a:t>
             </a:r>
-            <a:endParaRPr lang="hu-HU"/>
           </a:p>
         </p:txBody>
       </p:sp>
@@ -1589,7 +1580,6 @@
               <a:rPr lang="hu-HU"/>
               <a:t>Ötödik szint</a:t>
             </a:r>
-            <a:endParaRPr lang="hu-HU"/>
           </a:p>
         </p:txBody>
       </p:sp>
@@ -1610,7 +1600,7 @@
           <a:p>
             <a:fld id="{14184A55-F98C-4DCF-B43B-D8B9973F5BA3}" type="datetimeFigureOut">
               <a:rPr lang="hu-HU" smtClean="0"/>
-              <a:t>2016. 11. 20.</a:t>
+              <a:t>2016.11.23.</a:t>
             </a:fld>
             <a:endParaRPr lang="hu-HU"/>
           </a:p>
@@ -1707,7 +1697,6 @@
               <a:rPr lang="hu-HU"/>
               <a:t>Mintacím szerkesztése</a:t>
             </a:r>
-            <a:endParaRPr lang="hu-HU"/>
           </a:p>
         </p:txBody>
       </p:sp>
@@ -1728,7 +1717,7 @@
           <a:p>
             <a:fld id="{14184A55-F98C-4DCF-B43B-D8B9973F5BA3}" type="datetimeFigureOut">
               <a:rPr lang="hu-HU" smtClean="0"/>
-              <a:t>2016. 11. 20.</a:t>
+              <a:t>2016.11.23.</a:t>
             </a:fld>
             <a:endParaRPr lang="hu-HU"/>
           </a:p>
@@ -1823,7 +1812,7 @@
           <a:p>
             <a:fld id="{14184A55-F98C-4DCF-B43B-D8B9973F5BA3}" type="datetimeFigureOut">
               <a:rPr lang="hu-HU" smtClean="0"/>
-              <a:t>2016. 11. 20.</a:t>
+              <a:t>2016.11.23.</a:t>
             </a:fld>
             <a:endParaRPr lang="hu-HU"/>
           </a:p>
@@ -1929,7 +1918,6 @@
               <a:rPr lang="hu-HU"/>
               <a:t>Mintacím szerkesztése</a:t>
             </a:r>
-            <a:endParaRPr lang="hu-HU"/>
           </a:p>
         </p:txBody>
       </p:sp>
@@ -2014,7 +2002,6 @@
               <a:rPr lang="hu-HU"/>
               <a:t>Ötödik szint</a:t>
             </a:r>
-            <a:endParaRPr lang="hu-HU"/>
           </a:p>
         </p:txBody>
       </p:sp>
@@ -2100,7 +2087,7 @@
           <a:p>
             <a:fld id="{14184A55-F98C-4DCF-B43B-D8B9973F5BA3}" type="datetimeFigureOut">
               <a:rPr lang="hu-HU" smtClean="0"/>
-              <a:t>2016. 11. 20.</a:t>
+              <a:t>2016.11.23.</a:t>
             </a:fld>
             <a:endParaRPr lang="hu-HU"/>
           </a:p>
@@ -2206,7 +2193,6 @@
               <a:rPr lang="hu-HU"/>
               <a:t>Mintacím szerkesztése</a:t>
             </a:r>
-            <a:endParaRPr lang="hu-HU"/>
           </a:p>
         </p:txBody>
       </p:sp>
@@ -2353,7 +2339,7 @@
           <a:p>
             <a:fld id="{14184A55-F98C-4DCF-B43B-D8B9973F5BA3}" type="datetimeFigureOut">
               <a:rPr lang="hu-HU" smtClean="0"/>
-              <a:t>2016. 11. 20.</a:t>
+              <a:t>2016.11.23.</a:t>
             </a:fld>
             <a:endParaRPr lang="hu-HU"/>
           </a:p>
@@ -2465,7 +2451,6 @@
               <a:rPr lang="hu-HU"/>
               <a:t>Mintacím szerkesztése</a:t>
             </a:r>
-            <a:endParaRPr lang="hu-HU"/>
           </a:p>
         </p:txBody>
       </p:sp>
@@ -2527,7 +2512,6 @@
               <a:rPr lang="hu-HU"/>
               <a:t>Ötödik szint</a:t>
             </a:r>
-            <a:endParaRPr lang="hu-HU"/>
           </a:p>
         </p:txBody>
       </p:sp>
@@ -2566,7 +2550,7 @@
           <a:p>
             <a:fld id="{14184A55-F98C-4DCF-B43B-D8B9973F5BA3}" type="datetimeFigureOut">
               <a:rPr lang="hu-HU" smtClean="0"/>
-              <a:t>2016. 11. 20.</a:t>
+              <a:t>2016.11.23.</a:t>
             </a:fld>
             <a:endParaRPr lang="hu-HU"/>
           </a:p>
@@ -3029,99 +3013,99 @@
               <a:buChar char="•"/>
             </a:pPr>
             <a:r>
-              <a:rPr lang="hu-HU" dirty="0" err="1"/>
+              <a:rPr lang="hu-HU" sz="2200" dirty="0" err="1"/>
               <a:t>Purpose</a:t>
             </a:r>
             <a:r>
-              <a:rPr lang="hu-HU" dirty="0"/>
+              <a:rPr lang="hu-HU" sz="2200" dirty="0"/>
               <a:t> of </a:t>
             </a:r>
             <a:r>
-              <a:rPr lang="hu-HU" dirty="0" err="1"/>
+              <a:rPr lang="hu-HU" sz="2200" dirty="0" err="1"/>
               <a:t>object</a:t>
             </a:r>
             <a:r>
-              <a:rPr lang="hu-HU" dirty="0"/>
-              <a:t> </a:t>
-            </a:r>
-            <a:r>
-              <a:rPr lang="hu-HU" dirty="0" err="1"/>
+              <a:rPr lang="hu-HU" sz="2200" dirty="0"/>
+              <a:t> </a:t>
+            </a:r>
+            <a:r>
+              <a:rPr lang="hu-HU" sz="2200" dirty="0" err="1"/>
               <a:t>analysis</a:t>
             </a:r>
             <a:r>
-              <a:rPr lang="hu-HU" dirty="0"/>
+              <a:rPr lang="hu-HU" sz="2200" dirty="0"/>
               <a:t>: </a:t>
             </a:r>
             <a:r>
-              <a:rPr lang="en-US" dirty="0"/>
+              <a:rPr lang="en-US" sz="2200" dirty="0"/>
               <a:t>identify the objects</a:t>
             </a:r>
             <a:r>
-              <a:rPr lang="hu-HU" dirty="0"/>
+              <a:rPr lang="hu-HU" sz="2200" dirty="0"/>
               <a:t>, </a:t>
             </a:r>
             <a:r>
-              <a:rPr lang="en-US" dirty="0"/>
+              <a:rPr lang="en-US" sz="2200" dirty="0"/>
               <a:t>classes</a:t>
             </a:r>
             <a:r>
-              <a:rPr lang="hu-HU" dirty="0"/>
+              <a:rPr lang="hu-HU" sz="2200" dirty="0"/>
               <a:t>, </a:t>
             </a:r>
             <a:r>
-              <a:rPr lang="hu-HU" dirty="0" err="1"/>
+              <a:rPr lang="hu-HU" sz="2200" dirty="0" err="1"/>
               <a:t>operations</a:t>
             </a:r>
             <a:r>
-              <a:rPr lang="hu-HU" dirty="0"/>
+              <a:rPr lang="hu-HU" sz="2200" dirty="0"/>
               <a:t>, </a:t>
             </a:r>
             <a:r>
-              <a:rPr lang="hu-HU" dirty="0" err="1"/>
+              <a:rPr lang="hu-HU" sz="2200" dirty="0" err="1"/>
               <a:t>messages</a:t>
             </a:r>
             <a:r>
-              <a:rPr lang="hu-HU" dirty="0"/>
+              <a:rPr lang="hu-HU" sz="2200" dirty="0"/>
               <a:t>, </a:t>
             </a:r>
             <a:r>
-              <a:rPr lang="hu-HU" dirty="0" err="1"/>
+              <a:rPr lang="hu-HU" sz="2200" dirty="0" err="1"/>
               <a:t>events</a:t>
             </a:r>
             <a:r>
-              <a:rPr lang="hu-HU" dirty="0"/>
+              <a:rPr lang="hu-HU" sz="2200" dirty="0"/>
               <a:t>, </a:t>
             </a:r>
             <a:r>
-              <a:rPr lang="hu-HU" dirty="0" err="1"/>
+              <a:rPr lang="hu-HU" sz="2200" dirty="0" err="1"/>
               <a:t>activities</a:t>
             </a:r>
             <a:r>
-              <a:rPr lang="hu-HU" dirty="0"/>
+              <a:rPr lang="hu-HU" sz="2200" dirty="0"/>
               <a:t>, </a:t>
             </a:r>
             <a:r>
-              <a:rPr lang="hu-HU" dirty="0" err="1"/>
+              <a:rPr lang="hu-HU" sz="2200" dirty="0" err="1"/>
               <a:t>use-cases</a:t>
             </a:r>
             <a:r>
-              <a:rPr lang="hu-HU" dirty="0"/>
+              <a:rPr lang="hu-HU" sz="2200" dirty="0"/>
               <a:t> in </a:t>
             </a:r>
             <a:r>
-              <a:rPr lang="hu-HU" dirty="0" err="1"/>
+              <a:rPr lang="hu-HU" sz="2200" dirty="0" err="1"/>
               <a:t>the</a:t>
             </a:r>
             <a:r>
-              <a:rPr lang="hu-HU" dirty="0"/>
-              <a:t> </a:t>
-            </a:r>
-            <a:r>
-              <a:rPr lang="hu-HU" dirty="0" err="1"/>
+              <a:rPr lang="hu-HU" sz="2200" dirty="0"/>
+              <a:t> </a:t>
+            </a:r>
+            <a:r>
+              <a:rPr lang="hu-HU" sz="2200" dirty="0" err="1"/>
               <a:t>system</a:t>
             </a:r>
             <a:r>
-              <a:rPr lang="hu-HU" dirty="0"/>
+              <a:rPr lang="hu-HU" sz="2200" dirty="0"/>
               <a:t>.</a:t>
             </a:r>
           </a:p>
@@ -3134,77 +3118,18 @@
               <a:buChar char="•"/>
             </a:pPr>
             <a:r>
-              <a:rPr lang="hu-HU" dirty="0" err="1"/>
-              <a:t>There</a:t>
-            </a:r>
-            <a:r>
-              <a:rPr lang="hu-HU" dirty="0"/>
-              <a:t> </a:t>
-            </a:r>
-            <a:r>
-              <a:rPr lang="hu-HU" dirty="0" err="1"/>
-              <a:t>are</a:t>
-            </a:r>
-            <a:r>
-              <a:rPr lang="hu-HU" dirty="0"/>
-              <a:t> </a:t>
-            </a:r>
-            <a:r>
-              <a:rPr lang="hu-HU" dirty="0" err="1"/>
-              <a:t>different</a:t>
-            </a:r>
-            <a:r>
-              <a:rPr lang="hu-HU" dirty="0"/>
-              <a:t> </a:t>
-            </a:r>
-            <a:r>
-              <a:rPr lang="hu-HU" dirty="0" err="1"/>
-              <a:t>stretgeis</a:t>
-            </a:r>
-            <a:r>
-              <a:rPr lang="hu-HU" dirty="0"/>
-              <a:t> </a:t>
-            </a:r>
-            <a:r>
-              <a:rPr lang="hu-HU" dirty="0" err="1"/>
-              <a:t>for</a:t>
-            </a:r>
-            <a:r>
-              <a:rPr lang="hu-HU" dirty="0"/>
-              <a:t> </a:t>
-            </a:r>
-            <a:r>
-              <a:rPr lang="hu-HU" dirty="0" err="1"/>
-              <a:t>the</a:t>
-            </a:r>
-            <a:r>
-              <a:rPr lang="hu-HU" dirty="0"/>
-              <a:t> </a:t>
-            </a:r>
-            <a:r>
-              <a:rPr lang="hu-HU" dirty="0" err="1"/>
-              <a:t>analysis</a:t>
-            </a:r>
-            <a:r>
-              <a:rPr lang="hu-HU" dirty="0"/>
-              <a:t> (</a:t>
-            </a:r>
-            <a:r>
-              <a:rPr lang="hu-HU" dirty="0" err="1"/>
-              <a:t>see</a:t>
-            </a:r>
-            <a:r>
-              <a:rPr lang="hu-HU" dirty="0"/>
-              <a:t> </a:t>
-            </a:r>
-            <a:r>
-              <a:rPr lang="hu-HU" dirty="0" err="1"/>
-              <a:t>below</a:t>
-            </a:r>
-            <a:r>
-              <a:rPr lang="hu-HU" dirty="0"/>
+              <a:rPr lang="hu-HU" sz="2200" dirty="0"/>
+              <a:t>There are different stretgeis for the analysis (see </a:t>
+            </a:r>
+            <a:r>
+              <a:rPr lang="hu-HU" sz="2200" dirty="0" smtClean="0"/>
+              <a:t>the previous presentaion</a:t>
+            </a:r>
+            <a:r>
+              <a:rPr lang="hu-HU" sz="2200" dirty="0" smtClean="0"/>
               <a:t>..)</a:t>
             </a:r>
+            <a:endParaRPr lang="hu-HU" sz="2200" dirty="0"/>
           </a:p>
           <a:p>
             <a:pPr marL="342900" indent="-342900" algn="l">
@@ -3215,159 +3140,159 @@
               <a:buChar char="•"/>
             </a:pPr>
             <a:r>
-              <a:rPr lang="hu-HU" dirty="0"/>
+              <a:rPr lang="hu-HU" sz="2200" dirty="0"/>
               <a:t>In </a:t>
             </a:r>
             <a:r>
-              <a:rPr lang="hu-HU" dirty="0" err="1"/>
+              <a:rPr lang="hu-HU" sz="2200" dirty="0" err="1"/>
               <a:t>this</a:t>
             </a:r>
             <a:r>
-              <a:rPr lang="hu-HU" dirty="0"/>
-              <a:t> </a:t>
-            </a:r>
-            <a:r>
-              <a:rPr lang="hu-HU" dirty="0" err="1"/>
+              <a:rPr lang="hu-HU" sz="2200" dirty="0"/>
+              <a:t> </a:t>
+            </a:r>
+            <a:r>
+              <a:rPr lang="hu-HU" sz="2200" dirty="0" err="1"/>
               <a:t>presenation</a:t>
             </a:r>
             <a:r>
-              <a:rPr lang="hu-HU" dirty="0"/>
+              <a:rPr lang="hu-HU" sz="2200" dirty="0"/>
               <a:t> we </a:t>
             </a:r>
             <a:r>
-              <a:rPr lang="hu-HU" dirty="0" err="1"/>
+              <a:rPr lang="hu-HU" sz="2200" dirty="0" err="1"/>
               <a:t>consider</a:t>
             </a:r>
             <a:r>
-              <a:rPr lang="hu-HU" dirty="0"/>
-              <a:t> </a:t>
-            </a:r>
-            <a:r>
-              <a:rPr lang="hu-HU" dirty="0" err="1"/>
+              <a:rPr lang="hu-HU" sz="2200" dirty="0"/>
+              <a:t> </a:t>
+            </a:r>
+            <a:r>
+              <a:rPr lang="hu-HU" sz="2200" dirty="0" err="1"/>
               <a:t>only</a:t>
             </a:r>
             <a:r>
-              <a:rPr lang="hu-HU" dirty="0"/>
-              <a:t> </a:t>
-            </a:r>
-            <a:r>
-              <a:rPr lang="hu-HU" dirty="0" err="1"/>
+              <a:rPr lang="hu-HU" sz="2200" dirty="0"/>
+              <a:t> </a:t>
+            </a:r>
+            <a:r>
+              <a:rPr lang="hu-HU" sz="2200" dirty="0" err="1"/>
               <a:t>six</a:t>
             </a:r>
             <a:r>
-              <a:rPr lang="hu-HU" dirty="0"/>
-              <a:t> </a:t>
-            </a:r>
-            <a:r>
-              <a:rPr lang="hu-HU" dirty="0" err="1"/>
+              <a:rPr lang="hu-HU" sz="2200" dirty="0"/>
+              <a:t> </a:t>
+            </a:r>
+            <a:r>
+              <a:rPr lang="hu-HU" sz="2200" dirty="0" err="1"/>
               <a:t>startgies</a:t>
             </a:r>
             <a:r>
-              <a:rPr lang="hu-HU" dirty="0"/>
+              <a:rPr lang="hu-HU" sz="2200" dirty="0"/>
               <a:t> (</a:t>
             </a:r>
             <a:r>
-              <a:rPr lang="hu-HU" dirty="0" err="1"/>
+              <a:rPr lang="hu-HU" sz="2200" dirty="0" err="1"/>
               <a:t>Identify</a:t>
             </a:r>
             <a:r>
-              <a:rPr lang="hu-HU" dirty="0"/>
-              <a:t> </a:t>
-            </a:r>
-            <a:r>
-              <a:rPr lang="hu-HU" dirty="0" err="1"/>
+              <a:rPr lang="hu-HU" sz="2200" dirty="0"/>
+              <a:t> </a:t>
+            </a:r>
+            <a:r>
+              <a:rPr lang="hu-HU" sz="2200" dirty="0" err="1"/>
               <a:t>real-word</a:t>
             </a:r>
             <a:r>
-              <a:rPr lang="hu-HU" dirty="0"/>
-              <a:t> </a:t>
-            </a:r>
-            <a:r>
-              <a:rPr lang="hu-HU" dirty="0" err="1"/>
+              <a:rPr lang="hu-HU" sz="2200" dirty="0"/>
+              <a:t> </a:t>
+            </a:r>
+            <a:r>
+              <a:rPr lang="hu-HU" sz="2200" dirty="0" err="1"/>
               <a:t>items</a:t>
             </a:r>
             <a:r>
-              <a:rPr lang="hu-HU" dirty="0"/>
+              <a:rPr lang="hu-HU" sz="2200" dirty="0"/>
               <a:t>, </a:t>
             </a:r>
             <a:r>
-              <a:rPr lang="hu-HU" dirty="0" err="1"/>
+              <a:rPr lang="hu-HU" sz="2200" dirty="0" err="1"/>
               <a:t>physical</a:t>
             </a:r>
             <a:r>
-              <a:rPr lang="hu-HU" dirty="0"/>
-              <a:t> </a:t>
-            </a:r>
-            <a:r>
-              <a:rPr lang="hu-HU" dirty="0" err="1"/>
+              <a:rPr lang="hu-HU" sz="2200" dirty="0"/>
+              <a:t> </a:t>
+            </a:r>
+            <a:r>
+              <a:rPr lang="hu-HU" sz="2200" dirty="0" err="1"/>
               <a:t>devies</a:t>
             </a:r>
             <a:r>
-              <a:rPr lang="hu-HU" dirty="0"/>
+              <a:rPr lang="hu-HU" sz="2200" dirty="0"/>
               <a:t>, </a:t>
             </a:r>
             <a:r>
-              <a:rPr lang="hu-HU" dirty="0" err="1"/>
+              <a:rPr lang="hu-HU" sz="2200" dirty="0" err="1"/>
               <a:t>key</a:t>
             </a:r>
             <a:r>
-              <a:rPr lang="hu-HU" dirty="0"/>
-              <a:t> </a:t>
-            </a:r>
-            <a:r>
-              <a:rPr lang="hu-HU" dirty="0" err="1"/>
+              <a:rPr lang="hu-HU" sz="2200" dirty="0"/>
+              <a:t> </a:t>
+            </a:r>
+            <a:r>
+              <a:rPr lang="hu-HU" sz="2200" dirty="0" err="1"/>
               <a:t>concepts</a:t>
             </a:r>
             <a:r>
-              <a:rPr lang="hu-HU" dirty="0"/>
+              <a:rPr lang="hu-HU" sz="2200" dirty="0"/>
               <a:t>, </a:t>
             </a:r>
             <a:r>
-              <a:rPr lang="hu-HU" dirty="0" err="1"/>
+              <a:rPr lang="hu-HU" sz="2200" dirty="0" err="1"/>
               <a:t>transaction</a:t>
             </a:r>
             <a:r>
-              <a:rPr lang="hu-HU" dirty="0"/>
+              <a:rPr lang="hu-HU" sz="2200" dirty="0"/>
               <a:t>, </a:t>
             </a:r>
             <a:r>
-              <a:rPr lang="hu-HU" dirty="0" err="1"/>
+              <a:rPr lang="hu-HU" sz="2200" dirty="0" err="1"/>
               <a:t>visual</a:t>
             </a:r>
             <a:r>
-              <a:rPr lang="hu-HU" dirty="0"/>
-              <a:t> </a:t>
-            </a:r>
-            <a:r>
-              <a:rPr lang="hu-HU" dirty="0" err="1"/>
+              <a:rPr lang="hu-HU" sz="2200" dirty="0"/>
+              <a:t> </a:t>
+            </a:r>
+            <a:r>
+              <a:rPr lang="hu-HU" sz="2200" dirty="0" err="1"/>
               <a:t>elements</a:t>
             </a:r>
             <a:r>
-              <a:rPr lang="hu-HU" dirty="0"/>
+              <a:rPr lang="hu-HU" sz="2200" dirty="0"/>
               <a:t>, </a:t>
             </a:r>
             <a:r>
-              <a:rPr lang="hu-HU" dirty="0" err="1"/>
+              <a:rPr lang="hu-HU" sz="2200" dirty="0" err="1"/>
               <a:t>control</a:t>
             </a:r>
             <a:r>
-              <a:rPr lang="hu-HU" dirty="0"/>
-              <a:t> </a:t>
-            </a:r>
-            <a:r>
-              <a:rPr lang="hu-HU" dirty="0" err="1"/>
+              <a:rPr lang="hu-HU" sz="2200" dirty="0"/>
+              <a:t> </a:t>
+            </a:r>
+            <a:r>
+              <a:rPr lang="hu-HU" sz="2200" dirty="0" err="1"/>
               <a:t>elements</a:t>
             </a:r>
             <a:r>
-              <a:rPr lang="hu-HU" dirty="0"/>
-              <a:t> </a:t>
-            </a:r>
-            <a:r>
-              <a:rPr lang="hu-HU" dirty="0" err="1"/>
+              <a:rPr lang="hu-HU" sz="2200" dirty="0"/>
+              <a:t> </a:t>
+            </a:r>
+            <a:r>
+              <a:rPr lang="hu-HU" sz="2200" dirty="0" err="1"/>
               <a:t>staregy</a:t>
             </a:r>
             <a:r>
-              <a:rPr lang="hu-HU" dirty="0"/>
+              <a:rPr lang="hu-HU" sz="2200" dirty="0"/>
               <a:t>)</a:t>
             </a:r>
           </a:p>
@@ -3380,75 +3305,75 @@
               <a:buChar char="•"/>
             </a:pPr>
             <a:r>
-              <a:rPr lang="hu-HU" dirty="0" err="1"/>
+              <a:rPr lang="hu-HU" sz="2200" dirty="0" err="1"/>
               <a:t>Using</a:t>
             </a:r>
             <a:r>
-              <a:rPr lang="hu-HU" dirty="0"/>
-              <a:t> </a:t>
-            </a:r>
-            <a:r>
-              <a:rPr lang="hu-HU" dirty="0" err="1"/>
+              <a:rPr lang="hu-HU" sz="2200" dirty="0"/>
+              <a:t> </a:t>
+            </a:r>
+            <a:r>
+              <a:rPr lang="hu-HU" sz="2200" dirty="0" err="1"/>
               <a:t>two</a:t>
             </a:r>
             <a:r>
-              <a:rPr lang="hu-HU" dirty="0"/>
-              <a:t> </a:t>
-            </a:r>
-            <a:r>
-              <a:rPr lang="hu-HU" dirty="0" err="1"/>
+              <a:rPr lang="hu-HU" sz="2200" dirty="0"/>
+              <a:t> </a:t>
+            </a:r>
+            <a:r>
+              <a:rPr lang="hu-HU" sz="2200" dirty="0" err="1"/>
               <a:t>case</a:t>
             </a:r>
             <a:r>
-              <a:rPr lang="hu-HU" dirty="0"/>
-              <a:t> </a:t>
-            </a:r>
-            <a:r>
-              <a:rPr lang="hu-HU" dirty="0" err="1"/>
+              <a:rPr lang="hu-HU" sz="2200" dirty="0"/>
+              <a:t> </a:t>
+            </a:r>
+            <a:r>
+              <a:rPr lang="hu-HU" sz="2200" dirty="0" err="1"/>
               <a:t>study</a:t>
             </a:r>
             <a:r>
-              <a:rPr lang="hu-HU" dirty="0"/>
-              <a:t> </a:t>
-            </a:r>
-            <a:r>
-              <a:rPr lang="hu-HU" dirty="0" err="1"/>
+              <a:rPr lang="hu-HU" sz="2200" dirty="0"/>
+              <a:t> </a:t>
+            </a:r>
+            <a:r>
+              <a:rPr lang="hu-HU" sz="2200" dirty="0" err="1"/>
               <a:t>for</a:t>
             </a:r>
             <a:r>
-              <a:rPr lang="hu-HU" dirty="0"/>
-              <a:t> </a:t>
-            </a:r>
-            <a:r>
-              <a:rPr lang="hu-HU" dirty="0" err="1"/>
+              <a:rPr lang="hu-HU" sz="2200" dirty="0"/>
+              <a:t> </a:t>
+            </a:r>
+            <a:r>
+              <a:rPr lang="hu-HU" sz="2200" dirty="0" err="1"/>
               <a:t>this</a:t>
             </a:r>
             <a:r>
-              <a:rPr lang="hu-HU" dirty="0"/>
+              <a:rPr lang="hu-HU" sz="2200" dirty="0"/>
               <a:t>: The </a:t>
             </a:r>
             <a:r>
-              <a:rPr lang="hu-HU" dirty="0" err="1"/>
+              <a:rPr lang="hu-HU" sz="2200" dirty="0" err="1"/>
               <a:t>Vhiechle</a:t>
             </a:r>
             <a:r>
-              <a:rPr lang="hu-HU" dirty="0"/>
-              <a:t> </a:t>
-            </a:r>
-            <a:r>
-              <a:rPr lang="hu-HU" dirty="0" err="1"/>
+              <a:rPr lang="hu-HU" sz="2200" dirty="0"/>
+              <a:t> </a:t>
+            </a:r>
+            <a:r>
+              <a:rPr lang="hu-HU" sz="2200" dirty="0" err="1"/>
               <a:t>Detector</a:t>
             </a:r>
             <a:r>
-              <a:rPr lang="hu-HU" dirty="0"/>
+              <a:rPr lang="hu-HU" sz="2200" dirty="0"/>
               <a:t> and </a:t>
             </a:r>
             <a:r>
-              <a:rPr lang="en-US" dirty="0"/>
+              <a:rPr lang="en-US" sz="2200" dirty="0"/>
               <a:t>The Coyote Mission Planning and Control System</a:t>
             </a:r>
             <a:r>
-              <a:rPr lang="hu-HU" dirty="0"/>
+              <a:rPr lang="hu-HU" sz="2200" dirty="0"/>
               <a:t> </a:t>
             </a:r>
           </a:p>

</xml_diff>